<commit_message>
Create what is a struct and struct syntax slide
</commit_message>
<xml_diff>
--- a/structs/go_struct.pptx
+++ b/structs/go_struct.pptx
@@ -6,6 +6,8 @@
   </p:sldMasterIdLst>
   <p:sldIdLst>
     <p:sldId id="256" r:id="rId2"/>
+    <p:sldId id="257" r:id="rId3"/>
+    <p:sldId id="258" r:id="rId4"/>
   </p:sldIdLst>
   <p:sldSz cx="12192000" cy="6858000"/>
   <p:notesSz cx="6858000" cy="9144000"/>
@@ -3456,6 +3458,218 @@
 </p:sld>
 </file>
 
+<file path=ppt/slides/slide2.xml><?xml version="1.0" encoding="utf-8"?>
+<p:sld xmlns:a="http://schemas.openxmlformats.org/drawingml/2006/main" xmlns:r="http://schemas.openxmlformats.org/officeDocument/2006/relationships" xmlns:p="http://schemas.openxmlformats.org/presentationml/2006/main">
+  <p:cSld>
+    <p:spTree>
+      <p:nvGrpSpPr>
+        <p:cNvPr id="1" name=""/>
+        <p:cNvGrpSpPr/>
+        <p:nvPr/>
+      </p:nvGrpSpPr>
+      <p:grpSpPr>
+        <a:xfrm>
+          <a:off x="0" y="0"/>
+          <a:ext cx="0" cy="0"/>
+          <a:chOff x="0" y="0"/>
+          <a:chExt cx="0" cy="0"/>
+        </a:xfrm>
+      </p:grpSpPr>
+      <p:sp>
+        <p:nvSpPr>
+          <p:cNvPr id="2" name="Title 1">
+            <a:extLst>
+              <a:ext uri="{FF2B5EF4-FFF2-40B4-BE49-F238E27FC236}">
+                <a16:creationId xmlns:a16="http://schemas.microsoft.com/office/drawing/2014/main" id="{0FEEC3F7-7ADC-4FAD-94BD-FBB952ACB289}"/>
+              </a:ext>
+            </a:extLst>
+          </p:cNvPr>
+          <p:cNvSpPr>
+            <a:spLocks noGrp="1"/>
+          </p:cNvSpPr>
+          <p:nvPr>
+            <p:ph type="title"/>
+          </p:nvPr>
+        </p:nvSpPr>
+        <p:spPr/>
+        <p:txBody>
+          <a:bodyPr/>
+          <a:lstStyle/>
+          <a:p>
+            <a:r>
+              <a:rPr lang="en-US" dirty="0"/>
+              <a:t>What is a struct?</a:t>
+            </a:r>
+          </a:p>
+        </p:txBody>
+      </p:sp>
+      <p:sp>
+        <p:nvSpPr>
+          <p:cNvPr id="3" name="Content Placeholder 2">
+            <a:extLst>
+              <a:ext uri="{FF2B5EF4-FFF2-40B4-BE49-F238E27FC236}">
+                <a16:creationId xmlns:a16="http://schemas.microsoft.com/office/drawing/2014/main" id="{54065301-FAD8-44B6-A13A-DF91E90BAB25}"/>
+              </a:ext>
+            </a:extLst>
+          </p:cNvPr>
+          <p:cNvSpPr>
+            <a:spLocks noGrp="1"/>
+          </p:cNvSpPr>
+          <p:nvPr>
+            <p:ph idx="1"/>
+          </p:nvPr>
+        </p:nvSpPr>
+        <p:spPr/>
+        <p:txBody>
+          <a:bodyPr/>
+          <a:lstStyle/>
+          <a:p>
+            <a:r>
+              <a:rPr lang="en-US" dirty="0"/>
+              <a:t>Structs in Go are typed collections of fields. They are used in grouping data together.</a:t>
+            </a:r>
+          </a:p>
+          <a:p>
+            <a:pPr lvl="1"/>
+            <a:r>
+              <a:rPr lang="en-US" dirty="0"/>
+              <a:t>For example a person struct could have a field for first &amp; last name &amp; phone number or like in our card project we could have a card struct with a suit and value field.</a:t>
+            </a:r>
+          </a:p>
+        </p:txBody>
+      </p:sp>
+    </p:spTree>
+    <p:extLst>
+      <p:ext uri="{BB962C8B-B14F-4D97-AF65-F5344CB8AC3E}">
+        <p14:creationId xmlns:p14="http://schemas.microsoft.com/office/powerpoint/2010/main" val="3849342264"/>
+      </p:ext>
+    </p:extLst>
+  </p:cSld>
+  <p:clrMapOvr>
+    <a:masterClrMapping/>
+  </p:clrMapOvr>
+</p:sld>
+</file>
+
+<file path=ppt/slides/slide3.xml><?xml version="1.0" encoding="utf-8"?>
+<p:sld xmlns:a="http://schemas.openxmlformats.org/drawingml/2006/main" xmlns:r="http://schemas.openxmlformats.org/officeDocument/2006/relationships" xmlns:p="http://schemas.openxmlformats.org/presentationml/2006/main">
+  <p:cSld>
+    <p:spTree>
+      <p:nvGrpSpPr>
+        <p:cNvPr id="1" name=""/>
+        <p:cNvGrpSpPr/>
+        <p:nvPr/>
+      </p:nvGrpSpPr>
+      <p:grpSpPr>
+        <a:xfrm>
+          <a:off x="0" y="0"/>
+          <a:ext cx="0" cy="0"/>
+          <a:chOff x="0" y="0"/>
+          <a:chExt cx="0" cy="0"/>
+        </a:xfrm>
+      </p:grpSpPr>
+      <p:sp>
+        <p:nvSpPr>
+          <p:cNvPr id="2" name="Title 1">
+            <a:extLst>
+              <a:ext uri="{FF2B5EF4-FFF2-40B4-BE49-F238E27FC236}">
+                <a16:creationId xmlns:a16="http://schemas.microsoft.com/office/drawing/2014/main" id="{2EEA2A52-2839-4038-95C6-EE4A1B3AE9FE}"/>
+              </a:ext>
+            </a:extLst>
+          </p:cNvPr>
+          <p:cNvSpPr>
+            <a:spLocks noGrp="1"/>
+          </p:cNvSpPr>
+          <p:nvPr>
+            <p:ph type="title"/>
+          </p:nvPr>
+        </p:nvSpPr>
+        <p:spPr/>
+        <p:txBody>
+          <a:bodyPr/>
+          <a:lstStyle/>
+          <a:p>
+            <a:r>
+              <a:rPr lang="en-US" dirty="0"/>
+              <a:t>Struct syntax</a:t>
+            </a:r>
+          </a:p>
+        </p:txBody>
+      </p:sp>
+      <p:sp>
+        <p:nvSpPr>
+          <p:cNvPr id="3" name="Content Placeholder 2">
+            <a:extLst>
+              <a:ext uri="{FF2B5EF4-FFF2-40B4-BE49-F238E27FC236}">
+                <a16:creationId xmlns:a16="http://schemas.microsoft.com/office/drawing/2014/main" id="{FCCD5A6D-4055-4F20-A486-2A0E744A4632}"/>
+              </a:ext>
+            </a:extLst>
+          </p:cNvPr>
+          <p:cNvSpPr>
+            <a:spLocks noGrp="1"/>
+          </p:cNvSpPr>
+          <p:nvPr>
+            <p:ph idx="1"/>
+          </p:nvPr>
+        </p:nvSpPr>
+        <p:spPr/>
+        <p:txBody>
+          <a:bodyPr/>
+          <a:lstStyle/>
+          <a:p>
+            <a:r>
+              <a:rPr lang="en-US" dirty="0"/>
+              <a:t>In our example we will create a struct that represents a person with a first and last name and age.</a:t>
+            </a:r>
+          </a:p>
+          <a:p>
+            <a:endParaRPr lang="en-US" dirty="0"/>
+          </a:p>
+        </p:txBody>
+      </p:sp>
+      <p:pic>
+        <p:nvPicPr>
+          <p:cNvPr id="5" name="Picture 4">
+            <a:extLst>
+              <a:ext uri="{FF2B5EF4-FFF2-40B4-BE49-F238E27FC236}">
+                <a16:creationId xmlns:a16="http://schemas.microsoft.com/office/drawing/2014/main" id="{6967848B-0ABA-4807-90EC-B53E47C62D70}"/>
+              </a:ext>
+            </a:extLst>
+          </p:cNvPr>
+          <p:cNvPicPr>
+            <a:picLocks noChangeAspect="1"/>
+          </p:cNvPicPr>
+          <p:nvPr/>
+        </p:nvPicPr>
+        <p:blipFill>
+          <a:blip r:embed="rId2"/>
+          <a:stretch>
+            <a:fillRect/>
+          </a:stretch>
+        </p:blipFill>
+        <p:spPr>
+          <a:xfrm>
+            <a:off x="4262115" y="3774496"/>
+            <a:ext cx="2848373" cy="1790950"/>
+          </a:xfrm>
+          <a:prstGeom prst="rect">
+            <a:avLst/>
+          </a:prstGeom>
+        </p:spPr>
+      </p:pic>
+    </p:spTree>
+    <p:extLst>
+      <p:ext uri="{BB962C8B-B14F-4D97-AF65-F5344CB8AC3E}">
+        <p14:creationId xmlns:p14="http://schemas.microsoft.com/office/powerpoint/2010/main" val="4259483765"/>
+      </p:ext>
+    </p:extLst>
+  </p:cSld>
+  <p:clrMapOvr>
+    <a:masterClrMapping/>
+  </p:clrMapOvr>
+</p:sld>
+</file>
+
 <file path=ppt/theme/theme1.xml><?xml version="1.0" encoding="utf-8"?>
 <a:theme xmlns:a="http://schemas.openxmlformats.org/drawingml/2006/main" name="Frame">
   <a:themeElements>

</xml_diff>

<commit_message>
Create slide for showing how to initialize a struct
</commit_message>
<xml_diff>
--- a/structs/go_struct.pptx
+++ b/structs/go_struct.pptx
@@ -8,6 +8,7 @@
     <p:sldId id="256" r:id="rId2"/>
     <p:sldId id="257" r:id="rId3"/>
     <p:sldId id="258" r:id="rId4"/>
+    <p:sldId id="259" r:id="rId5"/>
   </p:sldIdLst>
   <p:sldSz cx="12192000" cy="6858000"/>
   <p:notesSz cx="6858000" cy="9144000"/>
@@ -3670,6 +3671,155 @@
 </p:sld>
 </file>
 
+<file path=ppt/slides/slide4.xml><?xml version="1.0" encoding="utf-8"?>
+<p:sld xmlns:a="http://schemas.openxmlformats.org/drawingml/2006/main" xmlns:r="http://schemas.openxmlformats.org/officeDocument/2006/relationships" xmlns:p="http://schemas.openxmlformats.org/presentationml/2006/main">
+  <p:cSld>
+    <p:spTree>
+      <p:nvGrpSpPr>
+        <p:cNvPr id="1" name=""/>
+        <p:cNvGrpSpPr/>
+        <p:nvPr/>
+      </p:nvGrpSpPr>
+      <p:grpSpPr>
+        <a:xfrm>
+          <a:off x="0" y="0"/>
+          <a:ext cx="0" cy="0"/>
+          <a:chOff x="0" y="0"/>
+          <a:chExt cx="0" cy="0"/>
+        </a:xfrm>
+      </p:grpSpPr>
+      <p:sp>
+        <p:nvSpPr>
+          <p:cNvPr id="2" name="Title 1">
+            <a:extLst>
+              <a:ext uri="{FF2B5EF4-FFF2-40B4-BE49-F238E27FC236}">
+                <a16:creationId xmlns:a16="http://schemas.microsoft.com/office/drawing/2014/main" id="{C9772E29-8DCC-4E49-82E7-73FD0103683C}"/>
+              </a:ext>
+            </a:extLst>
+          </p:cNvPr>
+          <p:cNvSpPr>
+            <a:spLocks noGrp="1"/>
+          </p:cNvSpPr>
+          <p:nvPr>
+            <p:ph type="title"/>
+          </p:nvPr>
+        </p:nvSpPr>
+        <p:spPr/>
+        <p:txBody>
+          <a:bodyPr/>
+          <a:lstStyle/>
+          <a:p>
+            <a:r>
+              <a:rPr lang="en-US" dirty="0"/>
+              <a:t>Struct syntax</a:t>
+            </a:r>
+          </a:p>
+        </p:txBody>
+      </p:sp>
+      <p:sp>
+        <p:nvSpPr>
+          <p:cNvPr id="3" name="Content Placeholder 2">
+            <a:extLst>
+              <a:ext uri="{FF2B5EF4-FFF2-40B4-BE49-F238E27FC236}">
+                <a16:creationId xmlns:a16="http://schemas.microsoft.com/office/drawing/2014/main" id="{6B49097E-5929-478F-9980-D1CA012559A1}"/>
+              </a:ext>
+            </a:extLst>
+          </p:cNvPr>
+          <p:cNvSpPr>
+            <a:spLocks noGrp="1"/>
+          </p:cNvSpPr>
+          <p:nvPr>
+            <p:ph idx="1"/>
+          </p:nvPr>
+        </p:nvSpPr>
+        <p:spPr/>
+        <p:txBody>
+          <a:bodyPr/>
+          <a:lstStyle/>
+          <a:p>
+            <a:r>
+              <a:rPr lang="en-US" dirty="0"/>
+              <a:t>Now that we have created our person struct. There are multiple ways we can declare and initialize a person struct variable.</a:t>
+            </a:r>
+          </a:p>
+          <a:p>
+            <a:endParaRPr lang="en-US" dirty="0"/>
+          </a:p>
+        </p:txBody>
+      </p:sp>
+      <p:pic>
+        <p:nvPicPr>
+          <p:cNvPr id="5" name="Picture 4">
+            <a:extLst>
+              <a:ext uri="{FF2B5EF4-FFF2-40B4-BE49-F238E27FC236}">
+                <a16:creationId xmlns:a16="http://schemas.microsoft.com/office/drawing/2014/main" id="{2B906DB7-09D8-4C69-91CD-60353E920A63}"/>
+              </a:ext>
+            </a:extLst>
+          </p:cNvPr>
+          <p:cNvPicPr>
+            <a:picLocks noChangeAspect="1"/>
+          </p:cNvPicPr>
+          <p:nvPr/>
+        </p:nvPicPr>
+        <p:blipFill>
+          <a:blip r:embed="rId2"/>
+          <a:stretch>
+            <a:fillRect/>
+          </a:stretch>
+        </p:blipFill>
+        <p:spPr>
+          <a:xfrm>
+            <a:off x="4217362" y="3549388"/>
+            <a:ext cx="4184432" cy="1902015"/>
+          </a:xfrm>
+          <a:prstGeom prst="rect">
+            <a:avLst/>
+          </a:prstGeom>
+        </p:spPr>
+      </p:pic>
+      <p:pic>
+        <p:nvPicPr>
+          <p:cNvPr id="7" name="Picture 6">
+            <a:extLst>
+              <a:ext uri="{FF2B5EF4-FFF2-40B4-BE49-F238E27FC236}">
+                <a16:creationId xmlns:a16="http://schemas.microsoft.com/office/drawing/2014/main" id="{28B56664-994F-4685-88D9-A2CACB4D063C}"/>
+              </a:ext>
+            </a:extLst>
+          </p:cNvPr>
+          <p:cNvPicPr>
+            <a:picLocks noChangeAspect="1"/>
+          </p:cNvPicPr>
+          <p:nvPr/>
+        </p:nvPicPr>
+        <p:blipFill>
+          <a:blip r:embed="rId3"/>
+          <a:stretch>
+            <a:fillRect/>
+          </a:stretch>
+        </p:blipFill>
+        <p:spPr>
+          <a:xfrm>
+            <a:off x="4217362" y="5725020"/>
+            <a:ext cx="4210638" cy="895475"/>
+          </a:xfrm>
+          <a:prstGeom prst="rect">
+            <a:avLst/>
+          </a:prstGeom>
+        </p:spPr>
+      </p:pic>
+    </p:spTree>
+    <p:extLst>
+      <p:ext uri="{BB962C8B-B14F-4D97-AF65-F5344CB8AC3E}">
+        <p14:creationId xmlns:p14="http://schemas.microsoft.com/office/powerpoint/2010/main" val="1427551673"/>
+      </p:ext>
+    </p:extLst>
+  </p:cSld>
+  <p:clrMapOvr>
+    <a:masterClrMapping/>
+  </p:clrMapOvr>
+</p:sld>
+</file>
+
 <file path=ppt/theme/theme1.xml><?xml version="1.0" encoding="utf-8"?>
 <a:theme xmlns:a="http://schemas.openxmlformats.org/drawingml/2006/main" name="Frame">
   <a:themeElements>

</xml_diff>

<commit_message>
Create slide on using the dot operator
</commit_message>
<xml_diff>
--- a/structs/go_struct.pptx
+++ b/structs/go_struct.pptx
@@ -9,6 +9,7 @@
     <p:sldId id="257" r:id="rId3"/>
     <p:sldId id="258" r:id="rId4"/>
     <p:sldId id="259" r:id="rId5"/>
+    <p:sldId id="260" r:id="rId6"/>
   </p:sldIdLst>
   <p:sldSz cx="12192000" cy="6858000"/>
   <p:notesSz cx="6858000" cy="9144000"/>
@@ -3820,6 +3821,155 @@
 </p:sld>
 </file>
 
+<file path=ppt/slides/slide5.xml><?xml version="1.0" encoding="utf-8"?>
+<p:sld xmlns:a="http://schemas.openxmlformats.org/drawingml/2006/main" xmlns:r="http://schemas.openxmlformats.org/officeDocument/2006/relationships" xmlns:p="http://schemas.openxmlformats.org/presentationml/2006/main">
+  <p:cSld>
+    <p:spTree>
+      <p:nvGrpSpPr>
+        <p:cNvPr id="1" name=""/>
+        <p:cNvGrpSpPr/>
+        <p:nvPr/>
+      </p:nvGrpSpPr>
+      <p:grpSpPr>
+        <a:xfrm>
+          <a:off x="0" y="0"/>
+          <a:ext cx="0" cy="0"/>
+          <a:chOff x="0" y="0"/>
+          <a:chExt cx="0" cy="0"/>
+        </a:xfrm>
+      </p:grpSpPr>
+      <p:sp>
+        <p:nvSpPr>
+          <p:cNvPr id="2" name="Title 1">
+            <a:extLst>
+              <a:ext uri="{FF2B5EF4-FFF2-40B4-BE49-F238E27FC236}">
+                <a16:creationId xmlns:a16="http://schemas.microsoft.com/office/drawing/2014/main" id="{5F88B258-3E6F-443B-AE27-A538C7AD6BFF}"/>
+              </a:ext>
+            </a:extLst>
+          </p:cNvPr>
+          <p:cNvSpPr>
+            <a:spLocks noGrp="1"/>
+          </p:cNvSpPr>
+          <p:nvPr>
+            <p:ph type="title"/>
+          </p:nvPr>
+        </p:nvSpPr>
+        <p:spPr/>
+        <p:txBody>
+          <a:bodyPr/>
+          <a:lstStyle/>
+          <a:p>
+            <a:r>
+              <a:rPr lang="en-US" dirty="0"/>
+              <a:t>Struct syntax</a:t>
+            </a:r>
+          </a:p>
+        </p:txBody>
+      </p:sp>
+      <p:sp>
+        <p:nvSpPr>
+          <p:cNvPr id="3" name="Content Placeholder 2">
+            <a:extLst>
+              <a:ext uri="{FF2B5EF4-FFF2-40B4-BE49-F238E27FC236}">
+                <a16:creationId xmlns:a16="http://schemas.microsoft.com/office/drawing/2014/main" id="{274109B8-0D53-47C9-AA32-416B30A86C9C}"/>
+              </a:ext>
+            </a:extLst>
+          </p:cNvPr>
+          <p:cNvSpPr>
+            <a:spLocks noGrp="1"/>
+          </p:cNvSpPr>
+          <p:nvPr>
+            <p:ph idx="1"/>
+          </p:nvPr>
+        </p:nvSpPr>
+        <p:spPr/>
+        <p:txBody>
+          <a:bodyPr/>
+          <a:lstStyle/>
+          <a:p>
+            <a:r>
+              <a:rPr lang="en-US" dirty="0"/>
+              <a:t>To access specific fields in a struct variable you use the dot operator.</a:t>
+            </a:r>
+          </a:p>
+          <a:p>
+            <a:endParaRPr lang="en-US" dirty="0"/>
+          </a:p>
+        </p:txBody>
+      </p:sp>
+      <p:pic>
+        <p:nvPicPr>
+          <p:cNvPr id="5" name="Picture 4">
+            <a:extLst>
+              <a:ext uri="{FF2B5EF4-FFF2-40B4-BE49-F238E27FC236}">
+                <a16:creationId xmlns:a16="http://schemas.microsoft.com/office/drawing/2014/main" id="{2C538679-9089-4128-8BE6-052E066615A7}"/>
+              </a:ext>
+            </a:extLst>
+          </p:cNvPr>
+          <p:cNvPicPr>
+            <a:picLocks noChangeAspect="1"/>
+          </p:cNvPicPr>
+          <p:nvPr/>
+        </p:nvPicPr>
+        <p:blipFill>
+          <a:blip r:embed="rId2"/>
+          <a:stretch>
+            <a:fillRect/>
+          </a:stretch>
+        </p:blipFill>
+        <p:spPr>
+          <a:xfrm>
+            <a:off x="3869268" y="3582140"/>
+            <a:ext cx="4953691" cy="905001"/>
+          </a:xfrm>
+          <a:prstGeom prst="rect">
+            <a:avLst/>
+          </a:prstGeom>
+        </p:spPr>
+      </p:pic>
+      <p:pic>
+        <p:nvPicPr>
+          <p:cNvPr id="7" name="Picture 6">
+            <a:extLst>
+              <a:ext uri="{FF2B5EF4-FFF2-40B4-BE49-F238E27FC236}">
+                <a16:creationId xmlns:a16="http://schemas.microsoft.com/office/drawing/2014/main" id="{11AD4E97-C8EE-4A58-80A6-F132FA01DC4A}"/>
+              </a:ext>
+            </a:extLst>
+          </p:cNvPr>
+          <p:cNvPicPr>
+            <a:picLocks noChangeAspect="1"/>
+          </p:cNvPicPr>
+          <p:nvPr/>
+        </p:nvPicPr>
+        <p:blipFill>
+          <a:blip r:embed="rId3"/>
+          <a:stretch>
+            <a:fillRect/>
+          </a:stretch>
+        </p:blipFill>
+        <p:spPr>
+          <a:xfrm>
+            <a:off x="3869268" y="4672452"/>
+            <a:ext cx="4163006" cy="790685"/>
+          </a:xfrm>
+          <a:prstGeom prst="rect">
+            <a:avLst/>
+          </a:prstGeom>
+        </p:spPr>
+      </p:pic>
+    </p:spTree>
+    <p:extLst>
+      <p:ext uri="{BB962C8B-B14F-4D97-AF65-F5344CB8AC3E}">
+        <p14:creationId xmlns:p14="http://schemas.microsoft.com/office/powerpoint/2010/main" val="849781540"/>
+      </p:ext>
+    </p:extLst>
+  </p:cSld>
+  <p:clrMapOvr>
+    <a:masterClrMapping/>
+  </p:clrMapOvr>
+</p:sld>
+</file>
+
 <file path=ppt/theme/theme1.xml><?xml version="1.0" encoding="utf-8"?>
 <a:theme xmlns:a="http://schemas.openxmlformats.org/drawingml/2006/main" name="Frame">
   <a:themeElements>

</xml_diff>